<commit_message>
slides from the IETF
</commit_message>
<xml_diff>
--- a/89-sarker-rmcat-eval-test.pptx
+++ b/89-sarker-rmcat-eval-test.pptx
@@ -5,20 +5,19 @@
     <p:sldMasterId id="2147483661" r:id="rId1"/>
   </p:sldMasterIdLst>
   <p:notesMasterIdLst>
-    <p:notesMasterId r:id="rId13"/>
+    <p:notesMasterId r:id="rId12"/>
   </p:notesMasterIdLst>
   <p:sldIdLst>
     <p:sldId id="259" r:id="rId2"/>
-    <p:sldId id="272" r:id="rId3"/>
-    <p:sldId id="260" r:id="rId4"/>
-    <p:sldId id="261" r:id="rId5"/>
-    <p:sldId id="262" r:id="rId6"/>
-    <p:sldId id="263" r:id="rId7"/>
-    <p:sldId id="265" r:id="rId8"/>
-    <p:sldId id="269" r:id="rId9"/>
-    <p:sldId id="271" r:id="rId10"/>
-    <p:sldId id="268" r:id="rId11"/>
-    <p:sldId id="270" r:id="rId12"/>
+    <p:sldId id="260" r:id="rId3"/>
+    <p:sldId id="261" r:id="rId4"/>
+    <p:sldId id="262" r:id="rId5"/>
+    <p:sldId id="263" r:id="rId6"/>
+    <p:sldId id="265" r:id="rId7"/>
+    <p:sldId id="269" r:id="rId8"/>
+    <p:sldId id="271" r:id="rId9"/>
+    <p:sldId id="268" r:id="rId10"/>
+    <p:sldId id="270" r:id="rId11"/>
   </p:sldIdLst>
   <p:sldSz cx="9144000" cy="6858000" type="screen4x3"/>
   <p:notesSz cx="6858000" cy="9144000"/>
@@ -202,7 +201,7 @@
           <a:p>
             <a:fld id="{FB93E1E9-BE61-004C-95CD-C06F194C3B37}" type="datetimeFigureOut">
               <a:rPr lang="en-US" smtClean="0"/>
-              <a:t>02/03/14</a:t>
+              <a:t>04/03/14</a:t>
             </a:fld>
             <a:endParaRPr lang="en-US"/>
           </a:p>
@@ -543,7 +542,7 @@
           <a:p>
             <a:fld id="{C91D80FB-847D-AA46-9A91-65CA8AE0435A}" type="slidenum">
               <a:rPr lang="en-US" smtClean="0"/>
-              <a:t>3</a:t>
+              <a:t>2</a:t>
             </a:fld>
             <a:endParaRPr lang="en-US"/>
           </a:p>
@@ -743,7 +742,7 @@
           <a:p>
             <a:fld id="{6AC0B21F-6F0C-4C88-BF21-3A12B2C4FB08}" type="datetimeFigureOut">
               <a:rPr lang="en-US" smtClean="0"/>
-              <a:t>02/03/14</a:t>
+              <a:t>04/03/14</a:t>
             </a:fld>
             <a:endParaRPr lang="en-US"/>
           </a:p>
@@ -913,7 +912,7 @@
           <a:p>
             <a:fld id="{6AC0B21F-6F0C-4C88-BF21-3A12B2C4FB08}" type="datetimeFigureOut">
               <a:rPr lang="en-US" smtClean="0"/>
-              <a:t>02/03/14</a:t>
+              <a:t>04/03/14</a:t>
             </a:fld>
             <a:endParaRPr lang="en-US"/>
           </a:p>
@@ -1093,7 +1092,7 @@
           <a:p>
             <a:fld id="{6AC0B21F-6F0C-4C88-BF21-3A12B2C4FB08}" type="datetimeFigureOut">
               <a:rPr lang="en-US" smtClean="0"/>
-              <a:t>02/03/14</a:t>
+              <a:t>04/03/14</a:t>
             </a:fld>
             <a:endParaRPr lang="en-US"/>
           </a:p>
@@ -1263,7 +1262,7 @@
           <a:p>
             <a:fld id="{6AC0B21F-6F0C-4C88-BF21-3A12B2C4FB08}" type="datetimeFigureOut">
               <a:rPr lang="en-US" smtClean="0"/>
-              <a:t>02/03/14</a:t>
+              <a:t>04/03/14</a:t>
             </a:fld>
             <a:endParaRPr lang="en-US"/>
           </a:p>
@@ -1509,7 +1508,7 @@
           <a:p>
             <a:fld id="{6AC0B21F-6F0C-4C88-BF21-3A12B2C4FB08}" type="datetimeFigureOut">
               <a:rPr lang="en-US" smtClean="0"/>
-              <a:t>02/03/14</a:t>
+              <a:t>04/03/14</a:t>
             </a:fld>
             <a:endParaRPr lang="en-US"/>
           </a:p>
@@ -1797,7 +1796,7 @@
           <a:p>
             <a:fld id="{6AC0B21F-6F0C-4C88-BF21-3A12B2C4FB08}" type="datetimeFigureOut">
               <a:rPr lang="en-US" smtClean="0"/>
-              <a:t>02/03/14</a:t>
+              <a:t>04/03/14</a:t>
             </a:fld>
             <a:endParaRPr lang="en-US"/>
           </a:p>
@@ -2219,7 +2218,7 @@
           <a:p>
             <a:fld id="{6AC0B21F-6F0C-4C88-BF21-3A12B2C4FB08}" type="datetimeFigureOut">
               <a:rPr lang="en-US" smtClean="0"/>
-              <a:t>02/03/14</a:t>
+              <a:t>04/03/14</a:t>
             </a:fld>
             <a:endParaRPr lang="en-US"/>
           </a:p>
@@ -2337,7 +2336,7 @@
           <a:p>
             <a:fld id="{6AC0B21F-6F0C-4C88-BF21-3A12B2C4FB08}" type="datetimeFigureOut">
               <a:rPr lang="en-US" smtClean="0"/>
-              <a:t>02/03/14</a:t>
+              <a:t>04/03/14</a:t>
             </a:fld>
             <a:endParaRPr lang="en-US"/>
           </a:p>
@@ -2432,7 +2431,7 @@
           <a:p>
             <a:fld id="{6AC0B21F-6F0C-4C88-BF21-3A12B2C4FB08}" type="datetimeFigureOut">
               <a:rPr lang="en-US" smtClean="0"/>
-              <a:t>02/03/14</a:t>
+              <a:t>04/03/14</a:t>
             </a:fld>
             <a:endParaRPr lang="en-US"/>
           </a:p>
@@ -2709,7 +2708,7 @@
           <a:p>
             <a:fld id="{6AC0B21F-6F0C-4C88-BF21-3A12B2C4FB08}" type="datetimeFigureOut">
               <a:rPr lang="en-US" smtClean="0"/>
-              <a:t>02/03/14</a:t>
+              <a:t>04/03/14</a:t>
             </a:fld>
             <a:endParaRPr lang="en-US"/>
           </a:p>
@@ -2966,7 +2965,7 @@
           <a:p>
             <a:fld id="{6AC0B21F-6F0C-4C88-BF21-3A12B2C4FB08}" type="datetimeFigureOut">
               <a:rPr lang="en-US" smtClean="0"/>
-              <a:t>02/03/14</a:t>
+              <a:t>04/03/14</a:t>
             </a:fld>
             <a:endParaRPr lang="en-US"/>
           </a:p>
@@ -3184,7 +3183,7 @@
           <a:p>
             <a:fld id="{6AC0B21F-6F0C-4C88-BF21-3A12B2C4FB08}" type="datetimeFigureOut">
               <a:rPr lang="en-US" smtClean="0"/>
-              <a:t>02/03/14</a:t>
+              <a:t>04/03/14</a:t>
             </a:fld>
             <a:endParaRPr lang="en-US"/>
           </a:p>
@@ -3763,14 +3762,6 @@
               </a:rPr>
               <a:t>, Cisco Systems</a:t>
             </a:r>
-            <a:endParaRPr lang="en-US" dirty="0">
-              <a:solidFill>
-                <a:schemeClr val="tx1">
-                  <a:lumMod val="50000"/>
-                  <a:lumOff val="50000"/>
-                </a:schemeClr>
-              </a:solidFill>
-            </a:endParaRPr>
           </a:p>
         </p:txBody>
       </p:sp>
@@ -3828,124 +3819,6 @@
           <a:p>
             <a:r>
               <a:rPr lang="en-US" dirty="0" smtClean="0"/>
-              <a:t>Wireless Test Cases</a:t>
-            </a:r>
-            <a:endParaRPr lang="en-US" dirty="0"/>
-          </a:p>
-        </p:txBody>
-      </p:sp>
-      <p:sp>
-        <p:nvSpPr>
-          <p:cNvPr id="3" name="Content Placeholder 2"/>
-          <p:cNvSpPr>
-            <a:spLocks noGrp="1"/>
-          </p:cNvSpPr>
-          <p:nvPr>
-            <p:ph idx="1"/>
-          </p:nvPr>
-        </p:nvSpPr>
-        <p:spPr/>
-        <p:txBody>
-          <a:bodyPr>
-            <a:normAutofit/>
-          </a:bodyPr>
-          <a:lstStyle/>
-          <a:p>
-            <a:r>
-              <a:rPr lang="en-US" dirty="0" smtClean="0"/>
-              <a:t>LTE Wireless cases in [draft-</a:t>
-            </a:r>
-            <a:r>
-              <a:rPr lang="en-US" dirty="0" err="1" smtClean="0"/>
-              <a:t>sarker</a:t>
-            </a:r>
-            <a:r>
-              <a:rPr lang="en-US" dirty="0" smtClean="0"/>
-              <a:t>-…]</a:t>
-            </a:r>
-          </a:p>
-          <a:p>
-            <a:pPr lvl="1"/>
-            <a:r>
-              <a:rPr lang="en-US" dirty="0" smtClean="0"/>
-              <a:t>Next presentation</a:t>
-            </a:r>
-          </a:p>
-          <a:p>
-            <a:pPr lvl="4"/>
-            <a:endParaRPr lang="en-US" dirty="0" smtClean="0"/>
-          </a:p>
-          <a:p>
-            <a:r>
-              <a:rPr lang="en-US" dirty="0" smtClean="0"/>
-              <a:t>WLAN wireless model </a:t>
-            </a:r>
-          </a:p>
-          <a:p>
-            <a:pPr lvl="1"/>
-            <a:r>
-              <a:rPr lang="en-US" dirty="0"/>
-              <a:t>Test case requires </a:t>
-            </a:r>
-            <a:r>
-              <a:rPr lang="en-US" dirty="0" smtClean="0"/>
-              <a:t>input</a:t>
-            </a:r>
-            <a:endParaRPr lang="en-US" dirty="0"/>
-          </a:p>
-          <a:p>
-            <a:pPr lvl="4"/>
-            <a:endParaRPr lang="en-US" dirty="0"/>
-          </a:p>
-        </p:txBody>
-      </p:sp>
-    </p:spTree>
-    <p:extLst>
-      <p:ext uri="{BB962C8B-B14F-4D97-AF65-F5344CB8AC3E}">
-        <p14:creationId xmlns:p14="http://schemas.microsoft.com/office/powerpoint/2010/main" val="250038882"/>
-      </p:ext>
-    </p:extLst>
-  </p:cSld>
-  <p:clrMapOvr>
-    <a:masterClrMapping/>
-  </p:clrMapOvr>
-</p:sld>
-</file>
-
-<file path=ppt/slides/slide11.xml><?xml version="1.0" encoding="utf-8"?>
-<p:sld xmlns:a="http://schemas.openxmlformats.org/drawingml/2006/main" xmlns:r="http://schemas.openxmlformats.org/officeDocument/2006/relationships" xmlns:p="http://schemas.openxmlformats.org/presentationml/2006/main">
-  <p:cSld>
-    <p:spTree>
-      <p:nvGrpSpPr>
-        <p:cNvPr id="1" name=""/>
-        <p:cNvGrpSpPr/>
-        <p:nvPr/>
-      </p:nvGrpSpPr>
-      <p:grpSpPr>
-        <a:xfrm>
-          <a:off x="0" y="0"/>
-          <a:ext cx="0" cy="0"/>
-          <a:chOff x="0" y="0"/>
-          <a:chExt cx="0" cy="0"/>
-        </a:xfrm>
-      </p:grpSpPr>
-      <p:sp>
-        <p:nvSpPr>
-          <p:cNvPr id="2" name="Title 1"/>
-          <p:cNvSpPr>
-            <a:spLocks noGrp="1"/>
-          </p:cNvSpPr>
-          <p:nvPr>
-            <p:ph type="title"/>
-          </p:nvPr>
-        </p:nvSpPr>
-        <p:spPr/>
-        <p:txBody>
-          <a:bodyPr/>
-          <a:lstStyle/>
-          <a:p>
-            <a:r>
-              <a:rPr lang="en-US" dirty="0" smtClean="0"/>
               <a:t>Next Steps</a:t>
             </a:r>
             <a:endParaRPr lang="en-US" dirty="0"/>
@@ -4025,7 +3898,6 @@
               <a:rPr lang="en-US" dirty="0" smtClean="0"/>
               <a:t>Adopt for WG item </a:t>
             </a:r>
-            <a:endParaRPr lang="en-US" dirty="0" smtClean="0"/>
           </a:p>
         </p:txBody>
       </p:sp>
@@ -4076,7 +3948,32 @@
           <a:p>
             <a:r>
               <a:rPr lang="en-US" dirty="0" smtClean="0"/>
-              <a:t>Changes to </a:t>
+              <a:t>Motivation</a:t>
+            </a:r>
+            <a:endParaRPr lang="en-US" dirty="0"/>
+          </a:p>
+        </p:txBody>
+      </p:sp>
+      <p:sp>
+        <p:nvSpPr>
+          <p:cNvPr id="3" name="Content Placeholder 2"/>
+          <p:cNvSpPr>
+            <a:spLocks noGrp="1"/>
+          </p:cNvSpPr>
+          <p:nvPr>
+            <p:ph idx="1"/>
+          </p:nvPr>
+        </p:nvSpPr>
+        <p:spPr/>
+        <p:txBody>
+          <a:bodyPr>
+            <a:normAutofit fontScale="85000" lnSpcReduction="10000"/>
+          </a:bodyPr>
+          <a:lstStyle/>
+          <a:p>
+            <a:r>
+              <a:rPr lang="en-US" dirty="0" smtClean="0"/>
+              <a:t>Move the test cases from the </a:t>
             </a:r>
             <a:r>
               <a:rPr lang="en-US" dirty="0" err="1" smtClean="0"/>
@@ -4084,65 +3981,60 @@
             </a:r>
             <a:r>
               <a:rPr lang="en-US" dirty="0" smtClean="0"/>
-              <a:t>-criteria</a:t>
-            </a:r>
+              <a:t>-criteria draft</a:t>
+            </a:r>
+          </a:p>
+          <a:p>
+            <a:pPr lvl="1"/>
+            <a:r>
+              <a:rPr lang="en-US" dirty="0" smtClean="0"/>
+              <a:t>Evaluation Parameters</a:t>
+            </a:r>
+          </a:p>
+          <a:p>
+            <a:pPr lvl="1"/>
+            <a:r>
+              <a:rPr lang="en-US" smtClean="0"/>
+              <a:t>Appendix B</a:t>
+            </a:r>
+            <a:endParaRPr lang="en-US" dirty="0" smtClean="0"/>
+          </a:p>
+          <a:p>
+            <a:pPr lvl="4"/>
+            <a:endParaRPr lang="en-US" dirty="0" smtClean="0"/>
+          </a:p>
+          <a:p>
+            <a:r>
+              <a:rPr lang="en-US" dirty="0" smtClean="0"/>
+              <a:t>Compare the performance of the algorithm(s) for a set of basic test cases.</a:t>
+            </a:r>
+          </a:p>
+          <a:p>
+            <a:pPr lvl="4"/>
+            <a:endParaRPr lang="en-US" dirty="0" smtClean="0"/>
+          </a:p>
+          <a:p>
+            <a:r>
+              <a:rPr lang="en-US" dirty="0"/>
+              <a:t>All tests have the same </a:t>
+            </a:r>
+            <a:r>
+              <a:rPr lang="en-US" dirty="0" smtClean="0"/>
+              <a:t>structure</a:t>
+            </a:r>
+          </a:p>
+          <a:p>
+            <a:pPr lvl="4"/>
             <a:endParaRPr lang="en-US" dirty="0"/>
           </a:p>
-        </p:txBody>
-      </p:sp>
-      <p:sp>
-        <p:nvSpPr>
-          <p:cNvPr id="3" name="Content Placeholder 2"/>
-          <p:cNvSpPr>
-            <a:spLocks noGrp="1"/>
-          </p:cNvSpPr>
-          <p:nvPr>
-            <p:ph idx="1"/>
-          </p:nvPr>
-        </p:nvSpPr>
-        <p:spPr/>
-        <p:txBody>
-          <a:bodyPr>
-            <a:normAutofit/>
-          </a:bodyPr>
-          <a:lstStyle/>
-          <a:p>
-            <a:r>
-              <a:rPr lang="en-US" sz="2800" dirty="0" smtClean="0"/>
-              <a:t>Move </a:t>
-            </a:r>
-            <a:r>
-              <a:rPr lang="ro-RO" sz="2800" dirty="0"/>
-              <a:t>Evaluation Parameters </a:t>
-            </a:r>
-            <a:r>
-              <a:rPr lang="ro-RO" sz="2800" dirty="0" smtClean="0"/>
-              <a:t>to this draft</a:t>
-            </a:r>
-            <a:endParaRPr lang="ro-RO" sz="2800" dirty="0"/>
-          </a:p>
-          <a:p>
-            <a:endParaRPr lang="en-US" sz="2800" dirty="0"/>
-          </a:p>
-          <a:p>
-            <a:r>
-              <a:rPr lang="en-US" sz="2800" dirty="0" smtClean="0"/>
-              <a:t>Move Appendix B to this draft</a:t>
-            </a:r>
-          </a:p>
-          <a:p>
-            <a:pPr lvl="1"/>
-            <a:r>
-              <a:rPr lang="en-US" sz="2400" dirty="0" smtClean="0"/>
-              <a:t>Proposal to evaluate Self-fairness of RMCAT congestion control algorithm</a:t>
-            </a:r>
-          </a:p>
-          <a:p>
-            <a:pPr lvl="1"/>
-            <a:endParaRPr lang="en-US" dirty="0"/>
-          </a:p>
-          <a:p>
-            <a:pPr marL="0" indent="0">
+          <a:p>
+            <a:r>
+              <a:rPr lang="en-US" dirty="0" smtClean="0"/>
+              <a:t>Easily extend the test case with new attributes</a:t>
+            </a:r>
+          </a:p>
+          <a:p>
+            <a:pPr marL="1828800" lvl="4" indent="0">
               <a:buNone/>
             </a:pPr>
             <a:endParaRPr lang="en-US" dirty="0"/>
@@ -4152,13 +4044,20 @@
     </p:spTree>
     <p:extLst>
       <p:ext uri="{BB962C8B-B14F-4D97-AF65-F5344CB8AC3E}">
-        <p14:creationId xmlns:p14="http://schemas.microsoft.com/office/powerpoint/2010/main" val="2989012947"/>
+        <p14:creationId xmlns:p14="http://schemas.microsoft.com/office/powerpoint/2010/main" val="1813019725"/>
       </p:ext>
     </p:extLst>
   </p:cSld>
   <p:clrMapOvr>
     <a:masterClrMapping/>
   </p:clrMapOvr>
+  <p:timing>
+    <p:tnLst>
+      <p:par>
+        <p:cTn xmlns:p14="http://schemas.microsoft.com/office/powerpoint/2010/main" id="1" dur="indefinite" restart="never" nodeType="tmRoot"/>
+      </p:par>
+    </p:tnLst>
+  </p:timing>
 </p:sld>
 </file>
 
@@ -4196,7 +4095,7 @@
           <a:p>
             <a:r>
               <a:rPr lang="en-US" dirty="0" smtClean="0"/>
-              <a:t>Motivation</a:t>
+              <a:t>Common Structure (1/2)</a:t>
             </a:r>
             <a:endParaRPr lang="en-US" dirty="0"/>
           </a:p>
@@ -4214,62 +4113,53 @@
         </p:nvSpPr>
         <p:spPr/>
         <p:txBody>
-          <a:bodyPr>
-            <a:normAutofit lnSpcReduction="10000"/>
-          </a:bodyPr>
-          <a:lstStyle/>
-          <a:p>
-            <a:r>
-              <a:rPr lang="en-US" dirty="0" smtClean="0"/>
-              <a:t>Move the test cases from the </a:t>
+          <a:bodyPr/>
+          <a:lstStyle/>
+          <a:p>
+            <a:r>
+              <a:rPr lang="en-US" dirty="0" smtClean="0"/>
+              <a:t>Description of the test</a:t>
+            </a:r>
+          </a:p>
+          <a:p>
+            <a:pPr lvl="1"/>
+            <a:r>
+              <a:rPr lang="en-US" dirty="0" smtClean="0"/>
+              <a:t>Why this test needs to be done?</a:t>
+            </a:r>
+          </a:p>
+          <a:p>
+            <a:pPr lvl="1"/>
+            <a:r>
+              <a:rPr lang="en-US" dirty="0" smtClean="0"/>
+              <a:t>What is the desired </a:t>
             </a:r>
             <a:r>
               <a:rPr lang="en-US" dirty="0" err="1" smtClean="0"/>
-              <a:t>eval</a:t>
-            </a:r>
-            <a:r>
-              <a:rPr lang="en-US" dirty="0" smtClean="0"/>
-              <a:t>-criteria draft</a:t>
-            </a:r>
-          </a:p>
-          <a:p>
-            <a:pPr lvl="4"/>
-            <a:endParaRPr lang="en-US" dirty="0" smtClean="0"/>
-          </a:p>
-          <a:p>
-            <a:r>
-              <a:rPr lang="en-US" dirty="0" smtClean="0"/>
-              <a:t>Compare the performance of the algorithm(s) for a set of basic test cases.</a:t>
-            </a:r>
-          </a:p>
-          <a:p>
-            <a:pPr lvl="4"/>
-            <a:endParaRPr lang="en-US" dirty="0" smtClean="0"/>
-          </a:p>
-          <a:p>
-            <a:r>
-              <a:rPr lang="en-US" dirty="0"/>
-              <a:t>All tests have the same </a:t>
-            </a:r>
-            <a:r>
-              <a:rPr lang="en-US" dirty="0" smtClean="0"/>
-              <a:t>structure</a:t>
-            </a:r>
-          </a:p>
-          <a:p>
-            <a:pPr lvl="4"/>
+              <a:t>behaviour</a:t>
+            </a:r>
+            <a:r>
+              <a:rPr lang="en-US" dirty="0" smtClean="0"/>
+              <a:t>?</a:t>
+            </a:r>
+          </a:p>
+          <a:p>
+            <a:pPr lvl="1"/>
+            <a:r>
+              <a:rPr lang="en-US" dirty="0" smtClean="0"/>
+              <a:t>How to measure the </a:t>
+            </a:r>
+            <a:r>
+              <a:rPr lang="en-US" dirty="0" err="1" smtClean="0"/>
+              <a:t>behaviour</a:t>
+            </a:r>
+            <a:r>
+              <a:rPr lang="en-US" dirty="0" smtClean="0"/>
+              <a:t>? (metrics)</a:t>
+            </a:r>
             <a:endParaRPr lang="en-US" dirty="0"/>
           </a:p>
           <a:p>
-            <a:r>
-              <a:rPr lang="en-US" dirty="0" smtClean="0"/>
-              <a:t>Easily extend the test case with new attributes</a:t>
-            </a:r>
-          </a:p>
-          <a:p>
-            <a:pPr marL="1828800" lvl="4" indent="0">
-              <a:buNone/>
-            </a:pPr>
             <a:endParaRPr lang="en-US" dirty="0"/>
           </a:p>
         </p:txBody>
@@ -4277,7 +4167,7 @@
     </p:spTree>
     <p:extLst>
       <p:ext uri="{BB962C8B-B14F-4D97-AF65-F5344CB8AC3E}">
-        <p14:creationId xmlns:p14="http://schemas.microsoft.com/office/powerpoint/2010/main" val="1813019725"/>
+        <p14:creationId xmlns:p14="http://schemas.microsoft.com/office/powerpoint/2010/main" val="2202372283"/>
       </p:ext>
     </p:extLst>
   </p:cSld>
@@ -4327,8 +4217,12 @@
           <a:lstStyle/>
           <a:p>
             <a:r>
-              <a:rPr lang="en-US" dirty="0" smtClean="0"/>
-              <a:t>Common Structure (1/2)</a:t>
+              <a:rPr lang="en-US" dirty="0"/>
+              <a:t>Common Structure </a:t>
+            </a:r>
+            <a:r>
+              <a:rPr lang="en-US" dirty="0" smtClean="0"/>
+              <a:t>(2/2)</a:t>
             </a:r>
             <a:endParaRPr lang="en-US" dirty="0"/>
           </a:p>
@@ -4351,56 +4245,65 @@
           <a:p>
             <a:r>
               <a:rPr lang="en-US" dirty="0" smtClean="0"/>
-              <a:t>Description of the test</a:t>
+              <a:t>Topology</a:t>
             </a:r>
           </a:p>
           <a:p>
             <a:pPr lvl="1"/>
             <a:r>
               <a:rPr lang="en-US" dirty="0" smtClean="0"/>
-              <a:t>Why this test needs to be done?</a:t>
+              <a:t>Number of media sources</a:t>
             </a:r>
           </a:p>
           <a:p>
             <a:pPr lvl="1"/>
             <a:r>
               <a:rPr lang="en-US" dirty="0" smtClean="0"/>
-              <a:t>What is the desired </a:t>
-            </a:r>
-            <a:r>
-              <a:rPr lang="en-US" dirty="0" err="1" smtClean="0"/>
-              <a:t>behaviour</a:t>
-            </a:r>
-            <a:r>
-              <a:rPr lang="en-US" dirty="0" smtClean="0"/>
-              <a:t>?</a:t>
+              <a:t>Number of competing sources</a:t>
+            </a:r>
+          </a:p>
+          <a:p>
+            <a:pPr lvl="4"/>
+            <a:endParaRPr lang="en-US" dirty="0" smtClean="0"/>
+          </a:p>
+          <a:p>
+            <a:r>
+              <a:rPr lang="en-US" dirty="0" smtClean="0"/>
+              <a:t>Test bed attributes</a:t>
             </a:r>
           </a:p>
           <a:p>
             <a:pPr lvl="1"/>
             <a:r>
               <a:rPr lang="en-US" dirty="0" smtClean="0"/>
-              <a:t>How to measure the </a:t>
-            </a:r>
-            <a:r>
-              <a:rPr lang="en-US" dirty="0" err="1" smtClean="0"/>
-              <a:t>behaviour</a:t>
-            </a:r>
-            <a:r>
-              <a:rPr lang="en-US" dirty="0" smtClean="0"/>
-              <a:t>? (metrics)</a:t>
+              <a:t>Path characteristics</a:t>
+            </a:r>
+          </a:p>
+          <a:p>
+            <a:pPr lvl="1"/>
+            <a:r>
+              <a:rPr lang="en-US" dirty="0" smtClean="0"/>
+              <a:t>Media traffic characteristics</a:t>
+            </a:r>
+          </a:p>
+          <a:p>
+            <a:pPr lvl="1"/>
+            <a:r>
+              <a:rPr lang="en-US" dirty="0" smtClean="0"/>
+              <a:t>Competing Traffic characteristics</a:t>
             </a:r>
             <a:endParaRPr lang="en-US" dirty="0"/>
           </a:p>
           <a:p>
-            <a:endParaRPr lang="en-US" dirty="0"/>
+            <a:pPr lvl="1"/>
+            <a:endParaRPr lang="en-US" dirty="0" smtClean="0"/>
           </a:p>
         </p:txBody>
       </p:sp>
     </p:spTree>
     <p:extLst>
       <p:ext uri="{BB962C8B-B14F-4D97-AF65-F5344CB8AC3E}">
-        <p14:creationId xmlns:p14="http://schemas.microsoft.com/office/powerpoint/2010/main" val="2202372283"/>
+        <p14:creationId xmlns:p14="http://schemas.microsoft.com/office/powerpoint/2010/main" val="4271044401"/>
       </p:ext>
     </p:extLst>
   </p:cSld>
@@ -4450,12 +4353,8 @@
           <a:lstStyle/>
           <a:p>
             <a:r>
-              <a:rPr lang="en-US" dirty="0"/>
-              <a:t>Common Structure </a:t>
-            </a:r>
-            <a:r>
-              <a:rPr lang="en-US" dirty="0" smtClean="0"/>
-              <a:t>(2/2)</a:t>
+              <a:rPr lang="en-US" dirty="0" smtClean="0"/>
+              <a:t>Media source</a:t>
             </a:r>
             <a:endParaRPr lang="en-US" dirty="0"/>
           </a:p>
@@ -4471,28 +4370,42 @@
             <p:ph idx="1"/>
           </p:nvPr>
         </p:nvSpPr>
-        <p:spPr/>
-        <p:txBody>
-          <a:bodyPr/>
-          <a:lstStyle/>
-          <a:p>
-            <a:r>
-              <a:rPr lang="en-US" dirty="0" smtClean="0"/>
-              <a:t>Topology</a:t>
+        <p:spPr>
+          <a:xfrm>
+            <a:off x="457200" y="1600200"/>
+            <a:ext cx="8229600" cy="4925144"/>
+          </a:xfrm>
+        </p:spPr>
+        <p:txBody>
+          <a:bodyPr>
+            <a:normAutofit fontScale="92500" lnSpcReduction="20000"/>
+          </a:bodyPr>
+          <a:lstStyle/>
+          <a:p>
+            <a:r>
+              <a:rPr lang="en-US" dirty="0" smtClean="0"/>
+              <a:t>Range of adaptability: </a:t>
             </a:r>
           </a:p>
           <a:p>
             <a:pPr lvl="1"/>
             <a:r>
               <a:rPr lang="en-US" dirty="0" smtClean="0"/>
-              <a:t>Number of media sources</a:t>
+              <a:t>Bit rate, </a:t>
             </a:r>
           </a:p>
           <a:p>
             <a:pPr lvl="1"/>
             <a:r>
               <a:rPr lang="en-US" dirty="0" smtClean="0"/>
-              <a:t>Number of competing sources</a:t>
+              <a:t>Frame rate, frame resolution (video), </a:t>
+            </a:r>
+          </a:p>
+          <a:p>
+            <a:pPr lvl="1"/>
+            <a:r>
+              <a:rPr lang="en-US" dirty="0" smtClean="0"/>
+              <a:t>Frame size, sampling frequency (audio)</a:t>
             </a:r>
           </a:p>
           <a:p>
@@ -4502,33 +4415,47 @@
           <a:p>
             <a:r>
               <a:rPr lang="en-US" dirty="0" smtClean="0"/>
-              <a:t>Test bed attributes</a:t>
+              <a:t>Encoder’s responsiveness</a:t>
             </a:r>
           </a:p>
           <a:p>
             <a:pPr lvl="1"/>
             <a:r>
               <a:rPr lang="en-US" dirty="0" smtClean="0"/>
-              <a:t>Path characteristics</a:t>
+              <a:t>How quickly does it produce a new rate</a:t>
             </a:r>
           </a:p>
           <a:p>
             <a:pPr lvl="1"/>
             <a:r>
               <a:rPr lang="en-US" dirty="0" smtClean="0"/>
-              <a:t>Media traffic characteristics</a:t>
+              <a:t>Variation in the encoder output for a given target rate</a:t>
+            </a:r>
+          </a:p>
+          <a:p>
+            <a:pPr lvl="4"/>
+            <a:endParaRPr lang="en-US" dirty="0" smtClean="0"/>
+          </a:p>
+          <a:p>
+            <a:r>
+              <a:rPr lang="en-US" dirty="0" smtClean="0"/>
+              <a:t>Traffic Timeline</a:t>
             </a:r>
           </a:p>
           <a:p>
             <a:pPr lvl="1"/>
             <a:r>
               <a:rPr lang="en-US" dirty="0" smtClean="0"/>
-              <a:t>Competing Traffic characteristics</a:t>
-            </a:r>
+              <a:t>When to start and stop the media for each flow</a:t>
+            </a:r>
+          </a:p>
+          <a:p>
+            <a:endParaRPr lang="en-US" dirty="0" smtClean="0"/>
+          </a:p>
+          <a:p>
             <a:endParaRPr lang="en-US" dirty="0"/>
           </a:p>
           <a:p>
-            <a:pPr lvl="1"/>
             <a:endParaRPr lang="en-US" dirty="0" smtClean="0"/>
           </a:p>
         </p:txBody>
@@ -4536,7 +4463,7 @@
     </p:spTree>
     <p:extLst>
       <p:ext uri="{BB962C8B-B14F-4D97-AF65-F5344CB8AC3E}">
-        <p14:creationId xmlns:p14="http://schemas.microsoft.com/office/powerpoint/2010/main" val="4271044401"/>
+        <p14:creationId xmlns:p14="http://schemas.microsoft.com/office/powerpoint/2010/main" val="2060244316"/>
       </p:ext>
     </p:extLst>
   </p:cSld>
@@ -4587,7 +4514,7 @@
           <a:p>
             <a:r>
               <a:rPr lang="en-US" dirty="0" smtClean="0"/>
-              <a:t>Media source</a:t>
+              <a:t>Competing traffic</a:t>
             </a:r>
             <a:endParaRPr lang="en-US" dirty="0"/>
           </a:p>
@@ -4603,42 +4530,14 @@
             <p:ph idx="1"/>
           </p:nvPr>
         </p:nvSpPr>
-        <p:spPr>
-          <a:xfrm>
-            <a:off x="457200" y="1600200"/>
-            <a:ext cx="8229600" cy="4925144"/>
-          </a:xfrm>
-        </p:spPr>
-        <p:txBody>
-          <a:bodyPr>
-            <a:normAutofit fontScale="92500" lnSpcReduction="20000"/>
-          </a:bodyPr>
-          <a:lstStyle/>
-          <a:p>
-            <a:r>
-              <a:rPr lang="en-US" dirty="0" smtClean="0"/>
-              <a:t>Range of adaptability: </a:t>
-            </a:r>
-          </a:p>
-          <a:p>
-            <a:pPr lvl="1"/>
-            <a:r>
-              <a:rPr lang="en-US" dirty="0" smtClean="0"/>
-              <a:t>Bit rate, </a:t>
-            </a:r>
-          </a:p>
-          <a:p>
-            <a:pPr lvl="1"/>
-            <a:r>
-              <a:rPr lang="en-US" dirty="0" smtClean="0"/>
-              <a:t>Frame rate, frame resolution (video), </a:t>
-            </a:r>
-          </a:p>
-          <a:p>
-            <a:pPr lvl="1"/>
-            <a:r>
-              <a:rPr lang="en-US" dirty="0" smtClean="0"/>
-              <a:t>Frame size, sampling frequency (audio)</a:t>
+        <p:spPr/>
+        <p:txBody>
+          <a:bodyPr/>
+          <a:lstStyle/>
+          <a:p>
+            <a:r>
+              <a:rPr lang="en-US" dirty="0" smtClean="0"/>
+              <a:t>Type and Number of sources</a:t>
             </a:r>
           </a:p>
           <a:p>
@@ -4648,21 +4547,22 @@
           <a:p>
             <a:r>
               <a:rPr lang="en-US" dirty="0" smtClean="0"/>
-              <a:t>Encoder’s responsiveness</a:t>
+              <a:t>Congestion control</a:t>
             </a:r>
           </a:p>
           <a:p>
             <a:pPr lvl="1"/>
             <a:r>
               <a:rPr lang="en-US" dirty="0" smtClean="0"/>
-              <a:t>How quickly does it produce a new rate</a:t>
-            </a:r>
-          </a:p>
-          <a:p>
-            <a:pPr lvl="1"/>
-            <a:r>
-              <a:rPr lang="en-US" dirty="0" smtClean="0"/>
-              <a:t>Variation in the encoder output for a given target rate</a:t>
+              <a:t>TCP CUBIC, </a:t>
+            </a:r>
+            <a:r>
+              <a:rPr lang="en-US" dirty="0" err="1" smtClean="0"/>
+              <a:t>NewReno</a:t>
+            </a:r>
+            <a:r>
+              <a:rPr lang="en-US" dirty="0" smtClean="0"/>
+              <a:t>, Vegas, …</a:t>
             </a:r>
           </a:p>
           <a:p>
@@ -4672,31 +4572,26 @@
           <a:p>
             <a:r>
               <a:rPr lang="en-US" dirty="0" smtClean="0"/>
-              <a:t>Traffic Timeline</a:t>
+              <a:t>Traffic timeline</a:t>
             </a:r>
           </a:p>
           <a:p>
             <a:pPr lvl="1"/>
             <a:r>
               <a:rPr lang="en-US" dirty="0" smtClean="0"/>
-              <a:t>When to start and stop the media for each flow</a:t>
-            </a:r>
-          </a:p>
-          <a:p>
-            <a:endParaRPr lang="en-US" dirty="0" smtClean="0"/>
-          </a:p>
-          <a:p>
+              <a:t>When to start and stop the traffic for each competing traffic source.</a:t>
+            </a:r>
+          </a:p>
+          <a:p>
+            <a:pPr lvl="1"/>
             <a:endParaRPr lang="en-US" dirty="0"/>
-          </a:p>
-          <a:p>
-            <a:endParaRPr lang="en-US" dirty="0" smtClean="0"/>
           </a:p>
         </p:txBody>
       </p:sp>
     </p:spTree>
     <p:extLst>
       <p:ext uri="{BB962C8B-B14F-4D97-AF65-F5344CB8AC3E}">
-        <p14:creationId xmlns:p14="http://schemas.microsoft.com/office/powerpoint/2010/main" val="2060244316"/>
+        <p14:creationId xmlns:p14="http://schemas.microsoft.com/office/powerpoint/2010/main" val="936480868"/>
       </p:ext>
     </p:extLst>
   </p:cSld>
@@ -4747,7 +4642,7 @@
           <a:p>
             <a:r>
               <a:rPr lang="en-US" dirty="0" smtClean="0"/>
-              <a:t>Competing traffic</a:t>
+              <a:t>Test cases</a:t>
             </a:r>
             <a:endParaRPr lang="en-US" dirty="0"/>
           </a:p>
@@ -4765,79 +4660,158 @@
         </p:nvSpPr>
         <p:spPr/>
         <p:txBody>
-          <a:bodyPr/>
-          <a:lstStyle/>
-          <a:p>
-            <a:r>
-              <a:rPr lang="en-US" dirty="0" smtClean="0"/>
-              <a:t>Type and Number of sources</a:t>
-            </a:r>
-          </a:p>
-          <a:p>
-            <a:pPr lvl="4"/>
+          <a:bodyPr>
+            <a:normAutofit fontScale="62500" lnSpcReduction="20000"/>
+          </a:bodyPr>
+          <a:lstStyle/>
+          <a:p>
+            <a:pPr marL="514350" indent="-514350">
+              <a:buFont typeface="+mj-lt"/>
+              <a:buAutoNum type="arabicPeriod"/>
+            </a:pPr>
+            <a:r>
+              <a:rPr lang="en-US" dirty="0" smtClean="0"/>
+              <a:t>Single Flow with variable channel capacity</a:t>
+            </a:r>
+          </a:p>
+          <a:p>
+            <a:pPr marL="2686050" lvl="5" indent="-514350"/>
             <a:endParaRPr lang="en-US" dirty="0" smtClean="0"/>
           </a:p>
           <a:p>
-            <a:r>
-              <a:rPr lang="en-US" dirty="0" smtClean="0"/>
-              <a:t>Congestion control</a:t>
-            </a:r>
-          </a:p>
-          <a:p>
-            <a:pPr lvl="1"/>
-            <a:r>
-              <a:rPr lang="en-US" dirty="0" smtClean="0"/>
-              <a:t>TCP CUBIC, </a:t>
-            </a:r>
-            <a:r>
-              <a:rPr lang="en-US" dirty="0" err="1" smtClean="0"/>
-              <a:t>NewReno</a:t>
-            </a:r>
-            <a:r>
-              <a:rPr lang="en-US" dirty="0" smtClean="0"/>
-              <a:t>, Vegas, …</a:t>
-            </a:r>
-          </a:p>
-          <a:p>
-            <a:pPr lvl="4"/>
+            <a:pPr marL="514350" indent="-514350">
+              <a:buFont typeface="+mj-lt"/>
+              <a:buAutoNum type="arabicPeriod"/>
+            </a:pPr>
+            <a:r>
+              <a:rPr lang="en-US" dirty="0" smtClean="0"/>
+              <a:t>Single Flow on a limited path capacity</a:t>
+            </a:r>
+          </a:p>
+          <a:p>
+            <a:pPr marL="914400" lvl="1" indent="-514350"/>
+            <a:r>
+              <a:rPr lang="en-US" dirty="0" smtClean="0"/>
+              <a:t>Maximum media bit rate is higher than the available path capacity</a:t>
+            </a:r>
+          </a:p>
+          <a:p>
+            <a:pPr marL="2686050" lvl="5" indent="-514350"/>
             <a:endParaRPr lang="en-US" dirty="0" smtClean="0"/>
           </a:p>
           <a:p>
-            <a:r>
-              <a:rPr lang="en-US" dirty="0" smtClean="0"/>
-              <a:t>Traffic timeline</a:t>
-            </a:r>
-          </a:p>
-          <a:p>
-            <a:pPr lvl="1"/>
-            <a:r>
-              <a:rPr lang="en-US" dirty="0" smtClean="0"/>
-              <a:t>When to start and stop the traffic for each competing traffic source.</a:t>
-            </a:r>
-          </a:p>
-          <a:p>
-            <a:pPr lvl="1"/>
-            <a:endParaRPr lang="en-US" dirty="0"/>
+            <a:pPr marL="514350" indent="-514350">
+              <a:buFont typeface="+mj-lt"/>
+              <a:buAutoNum type="arabicPeriod"/>
+            </a:pPr>
+            <a:r>
+              <a:rPr lang="en-US" dirty="0" smtClean="0"/>
+              <a:t>Multiple RMCAT flows using the same algorithm</a:t>
+            </a:r>
+          </a:p>
+          <a:p>
+            <a:pPr marL="2686050" lvl="5" indent="-514350"/>
+            <a:endParaRPr lang="en-US" dirty="0" smtClean="0"/>
+          </a:p>
+          <a:p>
+            <a:pPr marL="514350" indent="-514350">
+              <a:buFont typeface="+mj-lt"/>
+              <a:buAutoNum type="arabicPeriod"/>
+            </a:pPr>
+            <a:r>
+              <a:rPr lang="en-US" dirty="0" smtClean="0"/>
+              <a:t>Competing with a long TCP flow</a:t>
+            </a:r>
+          </a:p>
+          <a:p>
+            <a:pPr marL="2686050" lvl="5" indent="-514350"/>
+            <a:endParaRPr lang="en-US" dirty="0" smtClean="0"/>
+          </a:p>
+          <a:p>
+            <a:pPr marL="514350" indent="-514350">
+              <a:buFont typeface="+mj-lt"/>
+              <a:buAutoNum type="arabicPeriod"/>
+            </a:pPr>
+            <a:r>
+              <a:rPr lang="en-US" dirty="0" smtClean="0"/>
+              <a:t>Competing </a:t>
+            </a:r>
+            <a:r>
+              <a:rPr lang="en-US" smtClean="0"/>
+              <a:t>with </a:t>
+            </a:r>
+            <a:r>
+              <a:rPr lang="en-US" smtClean="0"/>
+              <a:t>multiple </a:t>
+            </a:r>
+            <a:r>
+              <a:rPr lang="en-US" dirty="0" smtClean="0"/>
+              <a:t>short </a:t>
+            </a:r>
+            <a:r>
+              <a:rPr lang="en-US" smtClean="0"/>
+              <a:t>TCP </a:t>
+            </a:r>
+            <a:r>
+              <a:rPr lang="en-US" smtClean="0"/>
+              <a:t>flows</a:t>
+            </a:r>
+            <a:endParaRPr lang="en-US" dirty="0" smtClean="0"/>
+          </a:p>
+          <a:p>
+            <a:pPr marL="2686050" lvl="5" indent="-514350"/>
+            <a:endParaRPr lang="en-US" dirty="0" smtClean="0"/>
+          </a:p>
+          <a:p>
+            <a:pPr marL="514350" indent="-514350">
+              <a:buFont typeface="+mj-lt"/>
+              <a:buAutoNum type="arabicPeriod"/>
+            </a:pPr>
+            <a:r>
+              <a:rPr lang="en-US" dirty="0" smtClean="0"/>
+              <a:t>Feedback channel is congested</a:t>
+            </a:r>
+          </a:p>
+          <a:p>
+            <a:pPr marL="2686050" lvl="5" indent="-514350"/>
+            <a:endParaRPr lang="en-US" dirty="0" smtClean="0"/>
+          </a:p>
+          <a:p>
+            <a:pPr marL="514350" indent="-514350">
+              <a:buFont typeface="+mj-lt"/>
+              <a:buAutoNum type="arabicPeriod"/>
+            </a:pPr>
+            <a:r>
+              <a:rPr lang="en-US" dirty="0" smtClean="0"/>
+              <a:t>RTT fairness: multiple media flow with different path RTTs</a:t>
+            </a:r>
+          </a:p>
+          <a:p>
+            <a:pPr marL="2686050" lvl="5" indent="-514350"/>
+            <a:endParaRPr lang="en-US" dirty="0" smtClean="0"/>
+          </a:p>
+          <a:p>
+            <a:pPr marL="514350" indent="-514350">
+              <a:buFont typeface="+mj-lt"/>
+              <a:buAutoNum type="arabicPeriod"/>
+            </a:pPr>
+            <a:r>
+              <a:rPr lang="en-US" dirty="0" smtClean="0"/>
+              <a:t>Media pause and resume</a:t>
+            </a:r>
           </a:p>
         </p:txBody>
       </p:sp>
     </p:spTree>
     <p:extLst>
       <p:ext uri="{BB962C8B-B14F-4D97-AF65-F5344CB8AC3E}">
-        <p14:creationId xmlns:p14="http://schemas.microsoft.com/office/powerpoint/2010/main" val="936480868"/>
+        <p14:creationId xmlns:p14="http://schemas.microsoft.com/office/powerpoint/2010/main" val="27453724"/>
       </p:ext>
     </p:extLst>
   </p:cSld>
   <p:clrMapOvr>
     <a:masterClrMapping/>
   </p:clrMapOvr>
-  <p:timing>
-    <p:tnLst>
-      <p:par>
-        <p:cTn xmlns:p14="http://schemas.microsoft.com/office/powerpoint/2010/main" id="1" dur="indefinite" restart="never" nodeType="tmRoot"/>
-      </p:par>
-    </p:tnLst>
-  </p:timing>
 </p:sld>
 </file>
 
@@ -4875,7 +4849,7 @@
           <a:p>
             <a:r>
               <a:rPr lang="en-US" dirty="0" smtClean="0"/>
-              <a:t>Test cases</a:t>
+              <a:t>Open Issues</a:t>
             </a:r>
             <a:endParaRPr lang="en-US" dirty="0"/>
           </a:p>
@@ -4893,156 +4867,43 @@
         </p:nvSpPr>
         <p:spPr/>
         <p:txBody>
-          <a:bodyPr>
-            <a:normAutofit fontScale="62500" lnSpcReduction="20000"/>
-          </a:bodyPr>
-          <a:lstStyle/>
-          <a:p>
-            <a:pPr marL="514350" indent="-514350">
-              <a:buFont typeface="+mj-lt"/>
-              <a:buAutoNum type="arabicPeriod"/>
-            </a:pPr>
-            <a:r>
-              <a:rPr lang="en-US" dirty="0" smtClean="0"/>
-              <a:t>Single Flow with variable channel </a:t>
-            </a:r>
-            <a:r>
-              <a:rPr lang="en-US" dirty="0" smtClean="0"/>
-              <a:t>capacity</a:t>
-            </a:r>
-          </a:p>
-          <a:p>
-            <a:pPr marL="2686050" lvl="5" indent="-514350"/>
-            <a:endParaRPr lang="en-US" dirty="0" smtClean="0"/>
-          </a:p>
-          <a:p>
-            <a:pPr marL="514350" indent="-514350">
-              <a:buFont typeface="+mj-lt"/>
-              <a:buAutoNum type="arabicPeriod"/>
-            </a:pPr>
-            <a:r>
-              <a:rPr lang="en-US" dirty="0" smtClean="0"/>
-              <a:t>Single Flow on a limited path capacity</a:t>
-            </a:r>
-          </a:p>
-          <a:p>
-            <a:pPr marL="914400" lvl="1" indent="-514350"/>
-            <a:r>
-              <a:rPr lang="en-US" dirty="0" smtClean="0"/>
-              <a:t>Maximum media bit rate is higher than the available path </a:t>
-            </a:r>
-            <a:r>
-              <a:rPr lang="en-US" dirty="0" smtClean="0"/>
-              <a:t>capacity</a:t>
-            </a:r>
-          </a:p>
-          <a:p>
-            <a:pPr marL="2686050" lvl="5" indent="-514350"/>
-            <a:endParaRPr lang="en-US" dirty="0" smtClean="0"/>
-          </a:p>
-          <a:p>
-            <a:pPr marL="514350" indent="-514350">
-              <a:buFont typeface="+mj-lt"/>
-              <a:buAutoNum type="arabicPeriod"/>
-            </a:pPr>
-            <a:r>
-              <a:rPr lang="en-US" dirty="0" smtClean="0"/>
-              <a:t>Multiple RMCAT flows using the same </a:t>
-            </a:r>
-            <a:r>
-              <a:rPr lang="en-US" dirty="0" smtClean="0"/>
-              <a:t>algorithm</a:t>
-            </a:r>
-          </a:p>
-          <a:p>
-            <a:pPr marL="2686050" lvl="5" indent="-514350"/>
-            <a:endParaRPr lang="en-US" dirty="0" smtClean="0"/>
-          </a:p>
-          <a:p>
-            <a:pPr marL="514350" indent="-514350">
-              <a:buFont typeface="+mj-lt"/>
-              <a:buAutoNum type="arabicPeriod"/>
-            </a:pPr>
-            <a:r>
-              <a:rPr lang="en-US" dirty="0" smtClean="0"/>
-              <a:t>Competing with a long TCP </a:t>
-            </a:r>
-            <a:r>
-              <a:rPr lang="en-US" dirty="0" smtClean="0"/>
-              <a:t>flow</a:t>
-            </a:r>
-          </a:p>
-          <a:p>
-            <a:pPr marL="2686050" lvl="5" indent="-514350"/>
-            <a:endParaRPr lang="en-US" dirty="0" smtClean="0"/>
-          </a:p>
-          <a:p>
-            <a:pPr marL="514350" indent="-514350">
-              <a:buFont typeface="+mj-lt"/>
-              <a:buAutoNum type="arabicPeriod"/>
-            </a:pPr>
-            <a:r>
-              <a:rPr lang="en-US" dirty="0" smtClean="0"/>
-              <a:t>Competing with a short TCP </a:t>
-            </a:r>
-            <a:r>
-              <a:rPr lang="en-US" dirty="0" smtClean="0"/>
-              <a:t>flow</a:t>
-            </a:r>
-          </a:p>
-          <a:p>
-            <a:pPr marL="2686050" lvl="5" indent="-514350"/>
-            <a:endParaRPr lang="en-US" dirty="0" smtClean="0"/>
-          </a:p>
-          <a:p>
-            <a:pPr marL="514350" indent="-514350">
-              <a:buFont typeface="+mj-lt"/>
-              <a:buAutoNum type="arabicPeriod"/>
-            </a:pPr>
-            <a:r>
-              <a:rPr lang="en-US" dirty="0" smtClean="0"/>
-              <a:t>Feedback channel is </a:t>
-            </a:r>
-            <a:r>
-              <a:rPr lang="en-US" dirty="0" smtClean="0"/>
-              <a:t>congested</a:t>
-            </a:r>
-          </a:p>
-          <a:p>
-            <a:pPr marL="2686050" lvl="5" indent="-514350"/>
-            <a:endParaRPr lang="en-US" dirty="0" smtClean="0"/>
-          </a:p>
-          <a:p>
-            <a:pPr marL="514350" indent="-514350">
-              <a:buFont typeface="+mj-lt"/>
-              <a:buAutoNum type="arabicPeriod"/>
-            </a:pPr>
-            <a:r>
-              <a:rPr lang="en-US" dirty="0" smtClean="0"/>
-              <a:t>RTT fairness: multiple media flow with different path </a:t>
-            </a:r>
-            <a:r>
-              <a:rPr lang="en-US" dirty="0" smtClean="0"/>
-              <a:t>RTTs</a:t>
-            </a:r>
-          </a:p>
-          <a:p>
-            <a:pPr marL="2686050" lvl="5" indent="-514350"/>
-            <a:endParaRPr lang="en-US" dirty="0" smtClean="0"/>
-          </a:p>
-          <a:p>
-            <a:pPr marL="514350" indent="-514350">
-              <a:buFont typeface="+mj-lt"/>
-              <a:buAutoNum type="arabicPeriod"/>
-            </a:pPr>
-            <a:r>
-              <a:rPr lang="en-US" dirty="0" smtClean="0"/>
-              <a:t>Media pause and </a:t>
-            </a:r>
-            <a:r>
-              <a:rPr lang="en-US" dirty="0" smtClean="0"/>
-              <a:t>resume</a:t>
-            </a:r>
+          <a:bodyPr/>
+          <a:lstStyle/>
+          <a:p>
+            <a:r>
+              <a:rPr lang="en-US" dirty="0" smtClean="0"/>
+              <a:t>Model short </a:t>
+            </a:r>
+            <a:r>
+              <a:rPr lang="en-US" dirty="0"/>
+              <a:t>TCP </a:t>
+            </a:r>
+          </a:p>
+          <a:p>
+            <a:pPr lvl="1"/>
+            <a:r>
+              <a:rPr lang="en-US" dirty="0"/>
+              <a:t>Better or more realistic model</a:t>
+            </a:r>
+          </a:p>
+          <a:p>
+            <a:pPr lvl="4"/>
+            <a:endParaRPr lang="en-US" dirty="0"/>
+          </a:p>
+          <a:p>
+            <a:r>
+              <a:rPr lang="en-US" dirty="0"/>
+              <a:t>Reaction to ECN </a:t>
+            </a:r>
+          </a:p>
+          <a:p>
+            <a:pPr lvl="1"/>
+            <a:r>
+              <a:rPr lang="en-US" dirty="0"/>
+              <a:t>Test case requires input</a:t>
+            </a:r>
+          </a:p>
+          <a:p>
             <a:endParaRPr lang="en-US" dirty="0" smtClean="0"/>
           </a:p>
         </p:txBody>
@@ -5050,7 +4911,7 @@
     </p:spTree>
     <p:extLst>
       <p:ext uri="{BB962C8B-B14F-4D97-AF65-F5344CB8AC3E}">
-        <p14:creationId xmlns:p14="http://schemas.microsoft.com/office/powerpoint/2010/main" val="27453724"/>
+        <p14:creationId xmlns:p14="http://schemas.microsoft.com/office/powerpoint/2010/main" val="1649653992"/>
       </p:ext>
     </p:extLst>
   </p:cSld>
@@ -5094,7 +4955,7 @@
           <a:p>
             <a:r>
               <a:rPr lang="en-US" dirty="0" smtClean="0"/>
-              <a:t>Open Issues</a:t>
+              <a:t>Wireless Test Cases</a:t>
             </a:r>
             <a:endParaRPr lang="en-US" dirty="0"/>
           </a:p>
@@ -5112,51 +4973,63 @@
         </p:nvSpPr>
         <p:spPr/>
         <p:txBody>
-          <a:bodyPr/>
-          <a:lstStyle/>
-          <a:p>
-            <a:r>
-              <a:rPr lang="en-US" dirty="0" smtClean="0"/>
-              <a:t>Model short </a:t>
-            </a:r>
+          <a:bodyPr>
+            <a:normAutofit/>
+          </a:bodyPr>
+          <a:lstStyle/>
+          <a:p>
+            <a:r>
+              <a:rPr lang="en-US" dirty="0" smtClean="0"/>
+              <a:t>LTE Wireless cases in [draft-</a:t>
+            </a:r>
+            <a:r>
+              <a:rPr lang="en-US" dirty="0" err="1" smtClean="0"/>
+              <a:t>sarker</a:t>
+            </a:r>
+            <a:r>
+              <a:rPr lang="en-US" dirty="0" smtClean="0"/>
+              <a:t>-…]</a:t>
+            </a:r>
+          </a:p>
+          <a:p>
+            <a:pPr lvl="1"/>
+            <a:r>
+              <a:rPr lang="en-US" dirty="0" smtClean="0"/>
+              <a:t>Next presentation</a:t>
+            </a:r>
+          </a:p>
+          <a:p>
+            <a:pPr lvl="4"/>
+            <a:endParaRPr lang="en-US" dirty="0" smtClean="0"/>
+          </a:p>
+          <a:p>
+            <a:r>
+              <a:rPr lang="en-US" dirty="0" smtClean="0"/>
+              <a:t>WLAN wireless model </a:t>
+            </a:r>
+          </a:p>
+          <a:p>
+            <a:pPr lvl="1"/>
             <a:r>
               <a:rPr lang="en-US" dirty="0"/>
-              <a:t>TCP </a:t>
-            </a:r>
-          </a:p>
-          <a:p>
-            <a:pPr lvl="1"/>
-            <a:r>
-              <a:rPr lang="en-US" dirty="0"/>
-              <a:t>Better or more realistic model</a:t>
-            </a:r>
+              <a:t>Test case requires </a:t>
+            </a:r>
+            <a:r>
+              <a:rPr lang="en-US" dirty="0" smtClean="0"/>
+              <a:t>input</a:t>
+            </a:r>
+            <a:endParaRPr lang="en-US" dirty="0"/>
           </a:p>
           <a:p>
             <a:pPr lvl="4"/>
             <a:endParaRPr lang="en-US" dirty="0"/>
-          </a:p>
-          <a:p>
-            <a:r>
-              <a:rPr lang="en-US" dirty="0"/>
-              <a:t>Reaction to ECN </a:t>
-            </a:r>
-          </a:p>
-          <a:p>
-            <a:pPr lvl="1"/>
-            <a:r>
-              <a:rPr lang="en-US" dirty="0"/>
-              <a:t>Test case requires input</a:t>
-            </a:r>
-          </a:p>
-          <a:p>
-            <a:endParaRPr lang="en-US" dirty="0" smtClean="0"/>
           </a:p>
         </p:txBody>
       </p:sp>
     </p:spTree>
     <p:extLst>
       <p:ext uri="{BB962C8B-B14F-4D97-AF65-F5344CB8AC3E}">
-        <p14:creationId xmlns:p14="http://schemas.microsoft.com/office/powerpoint/2010/main" val="1649653992"/>
+        <p14:creationId xmlns:p14="http://schemas.microsoft.com/office/powerpoint/2010/main" val="250038882"/>
       </p:ext>
     </p:extLst>
   </p:cSld>

</xml_diff>